<commit_message>
updates with more pictures and explanations
</commit_message>
<xml_diff>
--- a/Ingest/systemdiagram.pptx
+++ b/Ingest/systemdiagram.pptx
@@ -288,7 +288,7 @@
           <a:p>
             <a:fld id="{BF784866-C50F-E44F-9F5E-08B1F9CD451E}" type="datetimeFigureOut">
               <a:rPr lang="en-US" smtClean="0"/>
-              <a:t>3/9/16</a:t>
+              <a:t>3/11/16</a:t>
             </a:fld>
             <a:endParaRPr lang="en-US"/>
           </a:p>
@@ -458,7 +458,7 @@
           <a:p>
             <a:fld id="{BF784866-C50F-E44F-9F5E-08B1F9CD451E}" type="datetimeFigureOut">
               <a:rPr lang="en-US" smtClean="0"/>
-              <a:t>3/9/16</a:t>
+              <a:t>3/11/16</a:t>
             </a:fld>
             <a:endParaRPr lang="en-US"/>
           </a:p>
@@ -638,7 +638,7 @@
           <a:p>
             <a:fld id="{BF784866-C50F-E44F-9F5E-08B1F9CD451E}" type="datetimeFigureOut">
               <a:rPr lang="en-US" smtClean="0"/>
-              <a:t>3/9/16</a:t>
+              <a:t>3/11/16</a:t>
             </a:fld>
             <a:endParaRPr lang="en-US"/>
           </a:p>
@@ -808,7 +808,7 @@
           <a:p>
             <a:fld id="{BF784866-C50F-E44F-9F5E-08B1F9CD451E}" type="datetimeFigureOut">
               <a:rPr lang="en-US" smtClean="0"/>
-              <a:t>3/9/16</a:t>
+              <a:t>3/11/16</a:t>
             </a:fld>
             <a:endParaRPr lang="en-US"/>
           </a:p>
@@ -1054,7 +1054,7 @@
           <a:p>
             <a:fld id="{BF784866-C50F-E44F-9F5E-08B1F9CD451E}" type="datetimeFigureOut">
               <a:rPr lang="en-US" smtClean="0"/>
-              <a:t>3/9/16</a:t>
+              <a:t>3/11/16</a:t>
             </a:fld>
             <a:endParaRPr lang="en-US"/>
           </a:p>
@@ -1342,7 +1342,7 @@
           <a:p>
             <a:fld id="{BF784866-C50F-E44F-9F5E-08B1F9CD451E}" type="datetimeFigureOut">
               <a:rPr lang="en-US" smtClean="0"/>
-              <a:t>3/9/16</a:t>
+              <a:t>3/11/16</a:t>
             </a:fld>
             <a:endParaRPr lang="en-US"/>
           </a:p>
@@ -1764,7 +1764,7 @@
           <a:p>
             <a:fld id="{BF784866-C50F-E44F-9F5E-08B1F9CD451E}" type="datetimeFigureOut">
               <a:rPr lang="en-US" smtClean="0"/>
-              <a:t>3/9/16</a:t>
+              <a:t>3/11/16</a:t>
             </a:fld>
             <a:endParaRPr lang="en-US"/>
           </a:p>
@@ -1882,7 +1882,7 @@
           <a:p>
             <a:fld id="{BF784866-C50F-E44F-9F5E-08B1F9CD451E}" type="datetimeFigureOut">
               <a:rPr lang="en-US" smtClean="0"/>
-              <a:t>3/9/16</a:t>
+              <a:t>3/11/16</a:t>
             </a:fld>
             <a:endParaRPr lang="en-US"/>
           </a:p>
@@ -1977,7 +1977,7 @@
           <a:p>
             <a:fld id="{BF784866-C50F-E44F-9F5E-08B1F9CD451E}" type="datetimeFigureOut">
               <a:rPr lang="en-US" smtClean="0"/>
-              <a:t>3/9/16</a:t>
+              <a:t>3/11/16</a:t>
             </a:fld>
             <a:endParaRPr lang="en-US"/>
           </a:p>
@@ -2254,7 +2254,7 @@
           <a:p>
             <a:fld id="{BF784866-C50F-E44F-9F5E-08B1F9CD451E}" type="datetimeFigureOut">
               <a:rPr lang="en-US" smtClean="0"/>
-              <a:t>3/9/16</a:t>
+              <a:t>3/11/16</a:t>
             </a:fld>
             <a:endParaRPr lang="en-US"/>
           </a:p>
@@ -2507,7 +2507,7 @@
           <a:p>
             <a:fld id="{BF784866-C50F-E44F-9F5E-08B1F9CD451E}" type="datetimeFigureOut">
               <a:rPr lang="en-US" smtClean="0"/>
-              <a:t>3/9/16</a:t>
+              <a:t>3/11/16</a:t>
             </a:fld>
             <a:endParaRPr lang="en-US"/>
           </a:p>
@@ -2720,7 +2720,7 @@
           <a:p>
             <a:fld id="{BF784866-C50F-E44F-9F5E-08B1F9CD451E}" type="datetimeFigureOut">
               <a:rPr lang="en-US" smtClean="0"/>
-              <a:t>3/9/16</a:t>
+              <a:t>3/11/16</a:t>
             </a:fld>
             <a:endParaRPr lang="en-US"/>
           </a:p>
@@ -4344,283 +4344,13 @@
       </p:cxnSp>
       <p:cxnSp>
         <p:nvCxnSpPr>
-          <p:cNvPr id="71" name="Straight Arrow Connector 70"/>
-          <p:cNvCxnSpPr>
-            <a:stCxn id="5" idx="3"/>
-            <a:endCxn id="7" idx="1"/>
-          </p:cNvCxnSpPr>
-          <p:nvPr/>
-        </p:nvCxnSpPr>
-        <p:spPr>
-          <a:xfrm flipH="1" flipV="1">
-            <a:off x="3058160" y="2006600"/>
-            <a:ext cx="13720" cy="2230120"/>
-          </a:xfrm>
-          <a:prstGeom prst="straightConnector1">
-            <a:avLst/>
-          </a:prstGeom>
-          <a:ln>
-            <a:solidFill>
-              <a:srgbClr val="FF6600"/>
-            </a:solidFill>
-            <a:tailEnd type="arrow"/>
-          </a:ln>
-        </p:spPr>
-        <p:style>
-          <a:lnRef idx="2">
-            <a:schemeClr val="accent1"/>
-          </a:lnRef>
-          <a:fillRef idx="0">
-            <a:schemeClr val="accent1"/>
-          </a:fillRef>
-          <a:effectRef idx="1">
-            <a:schemeClr val="accent1"/>
-          </a:effectRef>
-          <a:fontRef idx="minor">
-            <a:schemeClr val="tx1"/>
-          </a:fontRef>
-        </p:style>
-      </p:cxnSp>
-      <p:cxnSp>
-        <p:nvCxnSpPr>
-          <p:cNvPr id="74" name="Straight Arrow Connector 73"/>
-          <p:cNvCxnSpPr>
-            <a:stCxn id="7" idx="0"/>
-            <a:endCxn id="8" idx="2"/>
-          </p:cNvCxnSpPr>
-          <p:nvPr/>
-        </p:nvCxnSpPr>
-        <p:spPr>
-          <a:xfrm>
-            <a:off x="3749040" y="1463040"/>
-            <a:ext cx="1310640" cy="0"/>
-          </a:xfrm>
-          <a:prstGeom prst="straightConnector1">
-            <a:avLst/>
-          </a:prstGeom>
-          <a:ln>
-            <a:solidFill>
-              <a:srgbClr val="FF6600"/>
-            </a:solidFill>
-            <a:tailEnd type="arrow"/>
-          </a:ln>
-        </p:spPr>
-        <p:style>
-          <a:lnRef idx="2">
-            <a:schemeClr val="accent1"/>
-          </a:lnRef>
-          <a:fillRef idx="0">
-            <a:schemeClr val="accent1"/>
-          </a:fillRef>
-          <a:effectRef idx="1">
-            <a:schemeClr val="accent1"/>
-          </a:effectRef>
-          <a:fontRef idx="minor">
-            <a:schemeClr val="tx1"/>
-          </a:fontRef>
-        </p:style>
-      </p:cxnSp>
-      <p:cxnSp>
-        <p:nvCxnSpPr>
-          <p:cNvPr id="77" name="Straight Arrow Connector 76"/>
-          <p:cNvCxnSpPr>
-            <a:stCxn id="7" idx="0"/>
-            <a:endCxn id="9" idx="2"/>
-          </p:cNvCxnSpPr>
-          <p:nvPr/>
-        </p:nvCxnSpPr>
-        <p:spPr>
-          <a:xfrm>
-            <a:off x="3749040" y="1463040"/>
-            <a:ext cx="1310640" cy="3347720"/>
-          </a:xfrm>
-          <a:prstGeom prst="straightConnector1">
-            <a:avLst/>
-          </a:prstGeom>
-          <a:ln>
-            <a:solidFill>
-              <a:srgbClr val="FF6600"/>
-            </a:solidFill>
-            <a:tailEnd type="arrow"/>
-          </a:ln>
-        </p:spPr>
-        <p:style>
-          <a:lnRef idx="2">
-            <a:schemeClr val="accent1"/>
-          </a:lnRef>
-          <a:fillRef idx="0">
-            <a:schemeClr val="accent1"/>
-          </a:fillRef>
-          <a:effectRef idx="1">
-            <a:schemeClr val="accent1"/>
-          </a:effectRef>
-          <a:fontRef idx="minor">
-            <a:schemeClr val="tx1"/>
-          </a:fontRef>
-        </p:style>
-      </p:cxnSp>
-      <p:cxnSp>
-        <p:nvCxnSpPr>
-          <p:cNvPr id="80" name="Straight Arrow Connector 79"/>
-          <p:cNvCxnSpPr>
-            <a:stCxn id="9" idx="3"/>
-            <a:endCxn id="10" idx="1"/>
-          </p:cNvCxnSpPr>
-          <p:nvPr/>
-        </p:nvCxnSpPr>
-        <p:spPr>
-          <a:xfrm flipV="1">
-            <a:off x="5699760" y="3738880"/>
-            <a:ext cx="1112520" cy="528320"/>
-          </a:xfrm>
-          <a:prstGeom prst="straightConnector1">
-            <a:avLst/>
-          </a:prstGeom>
-          <a:ln>
-            <a:solidFill>
-              <a:srgbClr val="FF6600"/>
-            </a:solidFill>
-            <a:tailEnd type="arrow"/>
-          </a:ln>
-        </p:spPr>
-        <p:style>
-          <a:lnRef idx="2">
-            <a:schemeClr val="accent1"/>
-          </a:lnRef>
-          <a:fillRef idx="0">
-            <a:schemeClr val="accent1"/>
-          </a:fillRef>
-          <a:effectRef idx="1">
-            <a:schemeClr val="accent1"/>
-          </a:effectRef>
-          <a:fontRef idx="minor">
-            <a:schemeClr val="tx1"/>
-          </a:fontRef>
-        </p:style>
-      </p:cxnSp>
-      <p:cxnSp>
-        <p:nvCxnSpPr>
-          <p:cNvPr id="83" name="Straight Arrow Connector 82"/>
-          <p:cNvCxnSpPr>
-            <a:stCxn id="8" idx="1"/>
-            <a:endCxn id="10" idx="3"/>
-          </p:cNvCxnSpPr>
-          <p:nvPr/>
-        </p:nvCxnSpPr>
-        <p:spPr>
-          <a:xfrm>
-            <a:off x="5699760" y="2006600"/>
-            <a:ext cx="1112520" cy="645160"/>
-          </a:xfrm>
-          <a:prstGeom prst="straightConnector1">
-            <a:avLst/>
-          </a:prstGeom>
-          <a:ln>
-            <a:solidFill>
-              <a:srgbClr val="FF6600"/>
-            </a:solidFill>
-            <a:tailEnd type="arrow"/>
-          </a:ln>
-        </p:spPr>
-        <p:style>
-          <a:lnRef idx="2">
-            <a:schemeClr val="accent1"/>
-          </a:lnRef>
-          <a:fillRef idx="0">
-            <a:schemeClr val="accent1"/>
-          </a:fillRef>
-          <a:effectRef idx="1">
-            <a:schemeClr val="accent1"/>
-          </a:effectRef>
-          <a:fontRef idx="minor">
-            <a:schemeClr val="tx1"/>
-          </a:fontRef>
-        </p:style>
-      </p:cxnSp>
-      <p:cxnSp>
-        <p:nvCxnSpPr>
-          <p:cNvPr id="86" name="Straight Arrow Connector 85"/>
-          <p:cNvCxnSpPr>
-            <a:stCxn id="4" idx="1"/>
-            <a:endCxn id="5" idx="3"/>
-          </p:cNvCxnSpPr>
-          <p:nvPr/>
-        </p:nvCxnSpPr>
-        <p:spPr>
-          <a:xfrm>
-            <a:off x="2189480" y="3738880"/>
-            <a:ext cx="882400" cy="497840"/>
-          </a:xfrm>
-          <a:prstGeom prst="straightConnector1">
-            <a:avLst/>
-          </a:prstGeom>
-          <a:ln>
-            <a:solidFill>
-              <a:srgbClr val="FF6600"/>
-            </a:solidFill>
-            <a:tailEnd type="arrow"/>
-          </a:ln>
-        </p:spPr>
-        <p:style>
-          <a:lnRef idx="2">
-            <a:schemeClr val="accent1"/>
-          </a:lnRef>
-          <a:fillRef idx="0">
-            <a:schemeClr val="accent1"/>
-          </a:fillRef>
-          <a:effectRef idx="1">
-            <a:schemeClr val="accent1"/>
-          </a:effectRef>
-          <a:fontRef idx="minor">
-            <a:schemeClr val="tx1"/>
-          </a:fontRef>
-        </p:style>
-      </p:cxnSp>
-      <p:cxnSp>
-        <p:nvCxnSpPr>
-          <p:cNvPr id="89" name="Straight Arrow Connector 88"/>
-          <p:cNvCxnSpPr/>
-          <p:nvPr/>
-        </p:nvCxnSpPr>
-        <p:spPr>
-          <a:xfrm>
-            <a:off x="237198" y="6279177"/>
-            <a:ext cx="621429" cy="0"/>
-          </a:xfrm>
-          <a:prstGeom prst="straightConnector1">
-            <a:avLst/>
-          </a:prstGeom>
-          <a:ln>
-            <a:solidFill>
-              <a:srgbClr val="FF6600"/>
-            </a:solidFill>
-            <a:tailEnd type="arrow"/>
-          </a:ln>
-        </p:spPr>
-        <p:style>
-          <a:lnRef idx="2">
-            <a:schemeClr val="accent1"/>
-          </a:lnRef>
-          <a:fillRef idx="0">
-            <a:schemeClr val="accent1"/>
-          </a:fillRef>
-          <a:effectRef idx="1">
-            <a:schemeClr val="accent1"/>
-          </a:effectRef>
-          <a:fontRef idx="minor">
-            <a:schemeClr val="tx1"/>
-          </a:fontRef>
-        </p:style>
-      </p:cxnSp>
-      <p:cxnSp>
-        <p:nvCxnSpPr>
           <p:cNvPr id="91" name="Straight Arrow Connector 90"/>
           <p:cNvCxnSpPr/>
           <p:nvPr/>
         </p:nvCxnSpPr>
         <p:spPr>
           <a:xfrm flipH="1">
-            <a:off x="237198" y="6644947"/>
+            <a:off x="134464" y="6363450"/>
             <a:ext cx="621429" cy="0"/>
           </a:xfrm>
           <a:prstGeom prst="straightConnector1">
@@ -4648,43 +4378,13 @@
       </p:cxnSp>
       <p:sp>
         <p:nvSpPr>
-          <p:cNvPr id="2" name="TextBox 1"/>
-          <p:cNvSpPr txBox="1"/>
-          <p:nvPr/>
-        </p:nvSpPr>
-        <p:spPr>
-          <a:xfrm>
-            <a:off x="889490" y="6094511"/>
-            <a:ext cx="1669786" cy="307777"/>
-          </a:xfrm>
-          <a:prstGeom prst="rect">
-            <a:avLst/>
-          </a:prstGeom>
-          <a:noFill/>
-        </p:spPr>
-        <p:txBody>
-          <a:bodyPr wrap="none" rtlCol="0">
-            <a:spAutoFit/>
-          </a:bodyPr>
-          <a:lstStyle/>
-          <a:p>
-            <a:r>
-              <a:rPr lang="en-US" sz="1400" dirty="0" smtClean="0"/>
-              <a:t>Update notifications</a:t>
-            </a:r>
-            <a:endParaRPr lang="en-US" sz="1400" dirty="0"/>
-          </a:p>
-        </p:txBody>
-      </p:sp>
-      <p:sp>
-        <p:nvSpPr>
           <p:cNvPr id="39" name="TextBox 38"/>
           <p:cNvSpPr txBox="1"/>
           <p:nvPr/>
         </p:nvSpPr>
         <p:spPr>
           <a:xfrm>
-            <a:off x="936559" y="6454064"/>
+            <a:off x="833825" y="6172567"/>
             <a:ext cx="1566605" cy="307777"/>
           </a:xfrm>
           <a:prstGeom prst="rect">

</xml_diff>